<commit_message>
Adjustments to presentation and notes after meeting added
</commit_message>
<xml_diff>
--- a/Prezentacja/prezentacja1PP.pptx
+++ b/Prezentacja/prezentacja1PP.pptx
@@ -6,11 +6,15 @@
   </p:sldMasterIdLst>
   <p:sldIdLst>
     <p:sldId id="256" r:id="rId2"/>
-    <p:sldId id="257" r:id="rId3"/>
-    <p:sldId id="260" r:id="rId4"/>
-    <p:sldId id="259" r:id="rId5"/>
-    <p:sldId id="258" r:id="rId6"/>
-    <p:sldId id="261" r:id="rId7"/>
+    <p:sldId id="263" r:id="rId3"/>
+    <p:sldId id="262" r:id="rId4"/>
+    <p:sldId id="257" r:id="rId5"/>
+    <p:sldId id="264" r:id="rId6"/>
+    <p:sldId id="260" r:id="rId7"/>
+    <p:sldId id="259" r:id="rId8"/>
+    <p:sldId id="265" r:id="rId9"/>
+    <p:sldId id="258" r:id="rId10"/>
+    <p:sldId id="261" r:id="rId11"/>
   </p:sldIdLst>
   <p:sldSz cx="12192000" cy="6858000"/>
   <p:notesSz cx="6858000" cy="9144000"/>
@@ -109,6 +113,11 @@
       </a:defRPr>
     </a:lvl9pPr>
   </p:defaultTextStyle>
+  <p:extLst>
+    <p:ext uri="{EFAFB233-063F-42B5-8137-9DF3F51BA10A}">
+      <p15:sldGuideLst xmlns:p15="http://schemas.microsoft.com/office/powerpoint/2012/main"/>
+    </p:ext>
+  </p:extLst>
 </p:presentation>
 </file>
 
@@ -1324,7 +1333,7 @@
             <a:fld id="{9334D819-9F07-4261-B09B-9E467E5D9002}" type="datetimeFigureOut">
               <a:rPr lang="en-US" dirty="0"/>
               <a:pPr/>
-              <a:t>4/2/2019</a:t>
+              <a:t>4/12/2019</a:t>
             </a:fld>
             <a:endParaRPr lang="en-US" dirty="0"/>
           </a:p>
@@ -1558,7 +1567,7 @@
           <a:p>
             <a:fld id="{9334D819-9F07-4261-B09B-9E467E5D9002}" type="datetimeFigureOut">
               <a:rPr lang="en-US" dirty="0"/>
-              <a:t>4/2/2019</a:t>
+              <a:t>4/12/2019</a:t>
             </a:fld>
             <a:endParaRPr lang="en-US" dirty="0"/>
           </a:p>
@@ -1733,7 +1742,7 @@
           <a:p>
             <a:fld id="{9334D819-9F07-4261-B09B-9E467E5D9002}" type="datetimeFigureOut">
               <a:rPr lang="en-US" dirty="0"/>
-              <a:t>4/2/2019</a:t>
+              <a:t>4/12/2019</a:t>
             </a:fld>
             <a:endParaRPr lang="en-US" dirty="0"/>
           </a:p>
@@ -1898,7 +1907,7 @@
           <a:p>
             <a:fld id="{9334D819-9F07-4261-B09B-9E467E5D9002}" type="datetimeFigureOut">
               <a:rPr lang="en-US" dirty="0"/>
-              <a:t>4/2/2019</a:t>
+              <a:t>4/12/2019</a:t>
             </a:fld>
             <a:endParaRPr lang="en-US" dirty="0"/>
           </a:p>
@@ -2170,7 +2179,7 @@
             <a:fld id="{9334D819-9F07-4261-B09B-9E467E5D9002}" type="datetimeFigureOut">
               <a:rPr lang="en-US" dirty="0"/>
               <a:pPr/>
-              <a:t>4/2/2019</a:t>
+              <a:t>4/12/2019</a:t>
             </a:fld>
             <a:endParaRPr lang="en-US" dirty="0"/>
           </a:p>
@@ -3367,7 +3376,7 @@
           <a:p>
             <a:fld id="{9334D819-9F07-4261-B09B-9E467E5D9002}" type="datetimeFigureOut">
               <a:rPr lang="en-US" dirty="0"/>
-              <a:t>4/2/2019</a:t>
+              <a:t>4/12/2019</a:t>
             </a:fld>
             <a:endParaRPr lang="en-US" dirty="0"/>
           </a:p>
@@ -3752,7 +3761,7 @@
           <a:p>
             <a:fld id="{9334D819-9F07-4261-B09B-9E467E5D9002}" type="datetimeFigureOut">
               <a:rPr lang="en-US" dirty="0"/>
-              <a:t>4/2/2019</a:t>
+              <a:t>4/12/2019</a:t>
             </a:fld>
             <a:endParaRPr lang="en-US" dirty="0"/>
           </a:p>
@@ -3870,7 +3879,7 @@
           <a:p>
             <a:fld id="{9334D819-9F07-4261-B09B-9E467E5D9002}" type="datetimeFigureOut">
               <a:rPr lang="en-US" dirty="0"/>
-              <a:t>4/2/2019</a:t>
+              <a:t>4/12/2019</a:t>
             </a:fld>
             <a:endParaRPr lang="en-US" dirty="0"/>
           </a:p>
@@ -3960,7 +3969,7 @@
           <a:p>
             <a:fld id="{9334D819-9F07-4261-B09B-9E467E5D9002}" type="datetimeFigureOut">
               <a:rPr lang="en-US" dirty="0"/>
-              <a:t>4/2/2019</a:t>
+              <a:t>4/12/2019</a:t>
             </a:fld>
             <a:endParaRPr lang="en-US" dirty="0"/>
           </a:p>
@@ -4718,7 +4727,7 @@
           <a:p>
             <a:fld id="{9334D819-9F07-4261-B09B-9E467E5D9002}" type="datetimeFigureOut">
               <a:rPr lang="en-US" dirty="0"/>
-              <a:t>4/2/2019</a:t>
+              <a:t>4/12/2019</a:t>
             </a:fld>
             <a:endParaRPr lang="en-US" dirty="0"/>
           </a:p>
@@ -5553,7 +5562,7 @@
           <a:p>
             <a:fld id="{9334D819-9F07-4261-B09B-9E467E5D9002}" type="datetimeFigureOut">
               <a:rPr lang="en-US" dirty="0"/>
-              <a:t>4/2/2019</a:t>
+              <a:t>4/12/2019</a:t>
             </a:fld>
             <a:endParaRPr lang="en-US" dirty="0"/>
           </a:p>
@@ -5776,7 +5785,7 @@
             <a:fld id="{9334D819-9F07-4261-B09B-9E467E5D9002}" type="datetimeFigureOut">
               <a:rPr lang="en-US" dirty="0"/>
               <a:pPr/>
-              <a:t>4/2/2019</a:t>
+              <a:t>4/12/2019</a:t>
             </a:fld>
             <a:endParaRPr lang="en-US" dirty="0"/>
           </a:p>
@@ -6787,7 +6796,12 @@
             <p:ph type="ctrTitle"/>
           </p:nvPr>
         </p:nvSpPr>
-        <p:spPr/>
+        <p:spPr>
+          <a:xfrm>
+            <a:off x="1078523" y="1098388"/>
+            <a:ext cx="10318418" cy="4394988"/>
+          </a:xfrm>
+        </p:spPr>
         <p:txBody>
           <a:bodyPr/>
           <a:lstStyle/>
@@ -6824,15 +6838,21 @@
         </p:nvSpPr>
         <p:spPr>
           <a:xfrm>
-            <a:off x="2215045" y="5493376"/>
-            <a:ext cx="8045373" cy="1228099"/>
+            <a:off x="2215045" y="5150840"/>
+            <a:ext cx="8045373" cy="1570635"/>
           </a:xfrm>
         </p:spPr>
         <p:txBody>
           <a:bodyPr>
-            <a:normAutofit/>
+            <a:normAutofit lnSpcReduction="10000"/>
           </a:bodyPr>
           <a:lstStyle/>
+          <a:p>
+            <a:r>
+              <a:rPr lang="pl-PL" dirty="0"/>
+              <a:t>Opiekun mgr inż. Faber Łukasz</a:t>
+            </a:r>
+          </a:p>
           <a:p>
             <a:r>
               <a:rPr lang="pl-PL" dirty="0"/>
@@ -6866,592 +6886,7 @@
 </p:sld>
 </file>
 
-<file path=ppt/slides/slide2.xml><?xml version="1.0" encoding="utf-8"?>
-<p:sld xmlns:a="http://schemas.openxmlformats.org/drawingml/2006/main" xmlns:r="http://schemas.openxmlformats.org/officeDocument/2006/relationships" xmlns:p="http://schemas.openxmlformats.org/presentationml/2006/main">
-  <p:cSld>
-    <p:spTree>
-      <p:nvGrpSpPr>
-        <p:cNvPr id="1" name=""/>
-        <p:cNvGrpSpPr/>
-        <p:nvPr/>
-      </p:nvGrpSpPr>
-      <p:grpSpPr>
-        <a:xfrm>
-          <a:off x="0" y="0"/>
-          <a:ext cx="0" cy="0"/>
-          <a:chOff x="0" y="0"/>
-          <a:chExt cx="0" cy="0"/>
-        </a:xfrm>
-      </p:grpSpPr>
-      <p:sp>
-        <p:nvSpPr>
-          <p:cNvPr id="2" name="Tytuł 1">
-            <a:extLst>
-              <a:ext uri="{FF2B5EF4-FFF2-40B4-BE49-F238E27FC236}">
-                <a16:creationId xmlns:a16="http://schemas.microsoft.com/office/drawing/2014/main" id="{702E222E-90DD-4711-A79C-8EF035BFE27A}"/>
-              </a:ext>
-            </a:extLst>
-          </p:cNvPr>
-          <p:cNvSpPr>
-            <a:spLocks noGrp="1"/>
-          </p:cNvSpPr>
-          <p:nvPr>
-            <p:ph type="title"/>
-          </p:nvPr>
-        </p:nvSpPr>
-        <p:spPr/>
-        <p:txBody>
-          <a:bodyPr/>
-          <a:lstStyle/>
-          <a:p>
-            <a:r>
-              <a:rPr lang="pl-PL" dirty="0"/>
-              <a:t>Wizja</a:t>
-            </a:r>
-          </a:p>
-        </p:txBody>
-      </p:sp>
-      <p:sp>
-        <p:nvSpPr>
-          <p:cNvPr id="3" name="Symbol zastępczy zawartości 2">
-            <a:extLst>
-              <a:ext uri="{FF2B5EF4-FFF2-40B4-BE49-F238E27FC236}">
-                <a16:creationId xmlns:a16="http://schemas.microsoft.com/office/drawing/2014/main" id="{E443DD13-261C-4866-83CA-9A33C38829B2}"/>
-              </a:ext>
-            </a:extLst>
-          </p:cNvPr>
-          <p:cNvSpPr>
-            <a:spLocks noGrp="1"/>
-          </p:cNvSpPr>
-          <p:nvPr>
-            <p:ph idx="1"/>
-          </p:nvPr>
-        </p:nvSpPr>
-        <p:spPr/>
-        <p:txBody>
-          <a:bodyPr/>
-          <a:lstStyle/>
-          <a:p>
-            <a:r>
-              <a:rPr lang="pl-PL" dirty="0"/>
-              <a:t>Celem projektu jest zapewnienie platformy mającej na celu organizacji i rozgrywania zwodów Nowoczesnej Szermierki Klasycznej. Zadaniem tego systemu będą takie składowe jak:</a:t>
-            </a:r>
-            <a:br>
-              <a:rPr lang="pl-PL" dirty="0"/>
-            </a:br>
-            <a:r>
-              <a:rPr lang="pl-PL" dirty="0"/>
-              <a:t>- wyznaczanie par walczących na każdym z etapów rozgrywek</a:t>
-            </a:r>
-            <a:br>
-              <a:rPr lang="pl-PL" dirty="0"/>
-            </a:br>
-            <a:r>
-              <a:rPr lang="pl-PL" dirty="0"/>
-              <a:t>- zbieranie wyników walk oraz ich przetwarzanie</a:t>
-            </a:r>
-            <a:br>
-              <a:rPr lang="pl-PL" dirty="0"/>
-            </a:br>
-            <a:r>
-              <a:rPr lang="pl-PL" dirty="0"/>
-              <a:t>- zapewnienie interfejsu operatora zawodów</a:t>
-            </a:r>
-            <a:br>
-              <a:rPr lang="pl-PL" dirty="0"/>
-            </a:br>
-            <a:r>
-              <a:rPr lang="pl-PL" dirty="0"/>
-              <a:t>- zapewnienie widoku publicznego</a:t>
-            </a:r>
-            <a:br>
-              <a:rPr lang="pl-PL" dirty="0"/>
-            </a:br>
-            <a:r>
-              <a:rPr lang="pl-PL" dirty="0"/>
-              <a:t>Istotnym elementem pracy jest zapewnienie niezawodności z uwagi na błędy wynikające z wypadków losowych oraz błędów operatora.</a:t>
-            </a:r>
-          </a:p>
-        </p:txBody>
-      </p:sp>
-    </p:spTree>
-    <p:extLst>
-      <p:ext uri="{BB962C8B-B14F-4D97-AF65-F5344CB8AC3E}">
-        <p14:creationId xmlns:p14="http://schemas.microsoft.com/office/powerpoint/2010/main" val="4247271838"/>
-      </p:ext>
-    </p:extLst>
-  </p:cSld>
-  <p:clrMapOvr>
-    <a:masterClrMapping/>
-  </p:clrMapOvr>
-</p:sld>
-</file>
-
-<file path=ppt/slides/slide3.xml><?xml version="1.0" encoding="utf-8"?>
-<p:sld xmlns:a="http://schemas.openxmlformats.org/drawingml/2006/main" xmlns:r="http://schemas.openxmlformats.org/officeDocument/2006/relationships" xmlns:p="http://schemas.openxmlformats.org/presentationml/2006/main">
-  <p:cSld>
-    <p:spTree>
-      <p:nvGrpSpPr>
-        <p:cNvPr id="1" name=""/>
-        <p:cNvGrpSpPr/>
-        <p:nvPr/>
-      </p:nvGrpSpPr>
-      <p:grpSpPr>
-        <a:xfrm>
-          <a:off x="0" y="0"/>
-          <a:ext cx="0" cy="0"/>
-          <a:chOff x="0" y="0"/>
-          <a:chExt cx="0" cy="0"/>
-        </a:xfrm>
-      </p:grpSpPr>
-      <p:sp>
-        <p:nvSpPr>
-          <p:cNvPr id="2" name="Tytuł 1">
-            <a:extLst>
-              <a:ext uri="{FF2B5EF4-FFF2-40B4-BE49-F238E27FC236}">
-                <a16:creationId xmlns:a16="http://schemas.microsoft.com/office/drawing/2014/main" id="{F34AA2D7-E321-4DA0-BC32-9B19DDFE9CB5}"/>
-              </a:ext>
-            </a:extLst>
-          </p:cNvPr>
-          <p:cNvSpPr>
-            <a:spLocks noGrp="1"/>
-          </p:cNvSpPr>
-          <p:nvPr>
-            <p:ph type="title"/>
-          </p:nvPr>
-        </p:nvSpPr>
-        <p:spPr/>
-        <p:txBody>
-          <a:bodyPr/>
-          <a:lstStyle/>
-          <a:p>
-            <a:r>
-              <a:rPr lang="pl-PL" dirty="0"/>
-              <a:t>Koncepcja </a:t>
-            </a:r>
-            <a:br>
-              <a:rPr lang="pl-PL" dirty="0"/>
-            </a:br>
-            <a:r>
-              <a:rPr lang="pl-PL" dirty="0"/>
-              <a:t>systemu</a:t>
-            </a:r>
-          </a:p>
-        </p:txBody>
-      </p:sp>
-      <p:sp>
-        <p:nvSpPr>
-          <p:cNvPr id="3" name="Symbol zastępczy zawartości 2">
-            <a:extLst>
-              <a:ext uri="{FF2B5EF4-FFF2-40B4-BE49-F238E27FC236}">
-                <a16:creationId xmlns:a16="http://schemas.microsoft.com/office/drawing/2014/main" id="{4CDAE5A1-1768-42D2-AD77-CEFCF6226EF4}"/>
-              </a:ext>
-            </a:extLst>
-          </p:cNvPr>
-          <p:cNvSpPr>
-            <a:spLocks noGrp="1"/>
-          </p:cNvSpPr>
-          <p:nvPr>
-            <p:ph idx="1"/>
-          </p:nvPr>
-        </p:nvSpPr>
-        <p:spPr/>
-        <p:txBody>
-          <a:bodyPr/>
-          <a:lstStyle/>
-          <a:p>
-            <a:r>
-              <a:rPr lang="pl-PL" dirty="0"/>
-              <a:t>Wykorzystamy:</a:t>
-            </a:r>
-          </a:p>
-          <a:p>
-            <a:pPr lvl="1"/>
-            <a:r>
-              <a:rPr lang="pl-PL" dirty="0"/>
-              <a:t>MVP</a:t>
-            </a:r>
-          </a:p>
-          <a:p>
-            <a:pPr lvl="1"/>
-            <a:r>
-              <a:rPr lang="pl-PL" dirty="0"/>
-              <a:t>Command Stack</a:t>
-            </a:r>
-          </a:p>
-          <a:p>
-            <a:pPr lvl="1"/>
-            <a:r>
-              <a:rPr lang="pl-PL" dirty="0"/>
-              <a:t>Strategy</a:t>
-            </a:r>
-          </a:p>
-          <a:p>
-            <a:pPr lvl="1"/>
-            <a:r>
-              <a:rPr lang="pl-PL" dirty="0"/>
-              <a:t>…</a:t>
-            </a:r>
-          </a:p>
-          <a:p>
-            <a:endParaRPr lang="pl-PL" dirty="0"/>
-          </a:p>
-        </p:txBody>
-      </p:sp>
-      <p:pic>
-        <p:nvPicPr>
-          <p:cNvPr id="5" name="Obraz 4">
-            <a:extLst>
-              <a:ext uri="{FF2B5EF4-FFF2-40B4-BE49-F238E27FC236}">
-                <a16:creationId xmlns:a16="http://schemas.microsoft.com/office/drawing/2014/main" id="{93F7D8D4-B8AE-4D04-AF6B-B1E04ED074F0}"/>
-              </a:ext>
-            </a:extLst>
-          </p:cNvPr>
-          <p:cNvPicPr>
-            <a:picLocks noChangeAspect="1"/>
-          </p:cNvPicPr>
-          <p:nvPr/>
-        </p:nvPicPr>
-        <p:blipFill>
-          <a:blip r:embed="rId2"/>
-          <a:stretch>
-            <a:fillRect/>
-          </a:stretch>
-        </p:blipFill>
-        <p:spPr>
-          <a:xfrm>
-            <a:off x="5299421" y="0"/>
-            <a:ext cx="6592995" cy="6858000"/>
-          </a:xfrm>
-          <a:prstGeom prst="rect">
-            <a:avLst/>
-          </a:prstGeom>
-        </p:spPr>
-      </p:pic>
-    </p:spTree>
-    <p:extLst>
-      <p:ext uri="{BB962C8B-B14F-4D97-AF65-F5344CB8AC3E}">
-        <p14:creationId xmlns:p14="http://schemas.microsoft.com/office/powerpoint/2010/main" val="1933639180"/>
-      </p:ext>
-    </p:extLst>
-  </p:cSld>
-  <p:clrMapOvr>
-    <a:masterClrMapping/>
-  </p:clrMapOvr>
-</p:sld>
-</file>
-
-<file path=ppt/slides/slide4.xml><?xml version="1.0" encoding="utf-8"?>
-<p:sld xmlns:a="http://schemas.openxmlformats.org/drawingml/2006/main" xmlns:r="http://schemas.openxmlformats.org/officeDocument/2006/relationships" xmlns:p="http://schemas.openxmlformats.org/presentationml/2006/main">
-  <p:cSld>
-    <p:spTree>
-      <p:nvGrpSpPr>
-        <p:cNvPr id="1" name=""/>
-        <p:cNvGrpSpPr/>
-        <p:nvPr/>
-      </p:nvGrpSpPr>
-      <p:grpSpPr>
-        <a:xfrm>
-          <a:off x="0" y="0"/>
-          <a:ext cx="0" cy="0"/>
-          <a:chOff x="0" y="0"/>
-          <a:chExt cx="0" cy="0"/>
-        </a:xfrm>
-      </p:grpSpPr>
-      <p:sp>
-        <p:nvSpPr>
-          <p:cNvPr id="2" name="Tytuł 1">
-            <a:extLst>
-              <a:ext uri="{FF2B5EF4-FFF2-40B4-BE49-F238E27FC236}">
-                <a16:creationId xmlns:a16="http://schemas.microsoft.com/office/drawing/2014/main" id="{8893EAF6-77BA-4088-ADAD-8D082152739B}"/>
-              </a:ext>
-            </a:extLst>
-          </p:cNvPr>
-          <p:cNvSpPr>
-            <a:spLocks noGrp="1"/>
-          </p:cNvSpPr>
-          <p:nvPr>
-            <p:ph type="title"/>
-          </p:nvPr>
-        </p:nvSpPr>
-        <p:spPr/>
-        <p:txBody>
-          <a:bodyPr/>
-          <a:lstStyle/>
-          <a:p>
-            <a:r>
-              <a:rPr lang="pl-PL" dirty="0"/>
-              <a:t>Wymagania Funkcjonalne</a:t>
-            </a:r>
-          </a:p>
-        </p:txBody>
-      </p:sp>
-      <p:sp>
-        <p:nvSpPr>
-          <p:cNvPr id="3" name="Symbol zastępczy zawartości 2">
-            <a:extLst>
-              <a:ext uri="{FF2B5EF4-FFF2-40B4-BE49-F238E27FC236}">
-                <a16:creationId xmlns:a16="http://schemas.microsoft.com/office/drawing/2014/main" id="{A08566AA-8F43-444B-BB48-44CE4E6851CA}"/>
-              </a:ext>
-            </a:extLst>
-          </p:cNvPr>
-          <p:cNvSpPr>
-            <a:spLocks noGrp="1"/>
-          </p:cNvSpPr>
-          <p:nvPr>
-            <p:ph idx="1"/>
-          </p:nvPr>
-        </p:nvSpPr>
-        <p:spPr/>
-        <p:txBody>
-          <a:bodyPr/>
-          <a:lstStyle/>
-          <a:p>
-            <a:r>
-              <a:rPr lang="pl-PL" dirty="0"/>
-              <a:t>Zapis ręczny i automatyczny stanu zawodów</a:t>
-            </a:r>
-          </a:p>
-          <a:p>
-            <a:r>
-              <a:rPr lang="pl-PL" dirty="0"/>
-              <a:t>Tryb wczytywania ustawień z pliku konfiguracyjnego (z możliwością ręcznej modyfikacje w trakcie pracy)</a:t>
-            </a:r>
-          </a:p>
-          <a:p>
-            <a:r>
-              <a:rPr lang="pl-PL" dirty="0"/>
-              <a:t>Umożliwienie dobierania strategii wyboru grup zawodników oraz wyboru tzw.  </a:t>
-            </a:r>
-            <a:r>
-              <a:rPr lang="pl-PL" dirty="0" err="1"/>
-              <a:t>killerów</a:t>
-            </a:r>
-            <a:endParaRPr lang="pl-PL" dirty="0"/>
-          </a:p>
-          <a:p>
-            <a:r>
-              <a:rPr lang="pl-PL" dirty="0"/>
-              <a:t>Pełne </a:t>
-            </a:r>
-            <a:r>
-              <a:rPr lang="pl-PL" dirty="0" err="1"/>
-              <a:t>Undo</a:t>
-            </a:r>
-            <a:r>
-              <a:rPr lang="pl-PL" dirty="0"/>
-              <a:t>-Redo (aż do startu zawodów)</a:t>
-            </a:r>
-          </a:p>
-          <a:p>
-            <a:r>
-              <a:rPr lang="pl-PL" dirty="0"/>
-              <a:t>Wyświetlanie wyników walk dla publiczności (nie zależnie od operatorów)</a:t>
-            </a:r>
-          </a:p>
-          <a:p>
-            <a:r>
-              <a:rPr lang="pl-PL" dirty="0"/>
-              <a:t>Nacisk na niezawodność i odtwarzalność danych</a:t>
-            </a:r>
-          </a:p>
-          <a:p>
-            <a:r>
-              <a:rPr lang="pl-PL" dirty="0"/>
-              <a:t>I wiele innych podanych przez klienta…</a:t>
-            </a:r>
-          </a:p>
-          <a:p>
-            <a:endParaRPr lang="pl-PL" dirty="0"/>
-          </a:p>
-        </p:txBody>
-      </p:sp>
-    </p:spTree>
-    <p:extLst>
-      <p:ext uri="{BB962C8B-B14F-4D97-AF65-F5344CB8AC3E}">
-        <p14:creationId xmlns:p14="http://schemas.microsoft.com/office/powerpoint/2010/main" val="2390996217"/>
-      </p:ext>
-    </p:extLst>
-  </p:cSld>
-  <p:clrMapOvr>
-    <a:masterClrMapping/>
-  </p:clrMapOvr>
-</p:sld>
-</file>
-
-<file path=ppt/slides/slide5.xml><?xml version="1.0" encoding="utf-8"?>
-<p:sld xmlns:a="http://schemas.openxmlformats.org/drawingml/2006/main" xmlns:r="http://schemas.openxmlformats.org/officeDocument/2006/relationships" xmlns:p="http://schemas.openxmlformats.org/presentationml/2006/main">
-  <p:cSld>
-    <p:spTree>
-      <p:nvGrpSpPr>
-        <p:cNvPr id="1" name=""/>
-        <p:cNvGrpSpPr/>
-        <p:nvPr/>
-      </p:nvGrpSpPr>
-      <p:grpSpPr>
-        <a:xfrm>
-          <a:off x="0" y="0"/>
-          <a:ext cx="0" cy="0"/>
-          <a:chOff x="0" y="0"/>
-          <a:chExt cx="0" cy="0"/>
-        </a:xfrm>
-      </p:grpSpPr>
-      <p:sp>
-        <p:nvSpPr>
-          <p:cNvPr id="2" name="Tytuł 1">
-            <a:extLst>
-              <a:ext uri="{FF2B5EF4-FFF2-40B4-BE49-F238E27FC236}">
-                <a16:creationId xmlns:a16="http://schemas.microsoft.com/office/drawing/2014/main" id="{33BDCB46-5B13-40E4-822D-AE5FFD46E052}"/>
-              </a:ext>
-            </a:extLst>
-          </p:cNvPr>
-          <p:cNvSpPr>
-            <a:spLocks noGrp="1"/>
-          </p:cNvSpPr>
-          <p:nvPr>
-            <p:ph type="title"/>
-          </p:nvPr>
-        </p:nvSpPr>
-        <p:spPr/>
-        <p:txBody>
-          <a:bodyPr/>
-          <a:lstStyle/>
-          <a:p>
-            <a:r>
-              <a:rPr lang="pl-PL" dirty="0"/>
-              <a:t>Technologia</a:t>
-            </a:r>
-          </a:p>
-        </p:txBody>
-      </p:sp>
-      <p:sp>
-        <p:nvSpPr>
-          <p:cNvPr id="3" name="Symbol zastępczy zawartości 2">
-            <a:extLst>
-              <a:ext uri="{FF2B5EF4-FFF2-40B4-BE49-F238E27FC236}">
-                <a16:creationId xmlns:a16="http://schemas.microsoft.com/office/drawing/2014/main" id="{EC55762C-E05D-4E1F-86B8-2148B1C6A497}"/>
-              </a:ext>
-            </a:extLst>
-          </p:cNvPr>
-          <p:cNvSpPr>
-            <a:spLocks noGrp="1"/>
-          </p:cNvSpPr>
-          <p:nvPr>
-            <p:ph idx="1"/>
-          </p:nvPr>
-        </p:nvSpPr>
-        <p:spPr>
-          <a:xfrm>
-            <a:off x="1251677" y="1763487"/>
-            <a:ext cx="10178322" cy="3593591"/>
-          </a:xfrm>
-        </p:spPr>
-        <p:txBody>
-          <a:bodyPr/>
-          <a:lstStyle/>
-          <a:p>
-            <a:r>
-              <a:rPr lang="pl-PL" dirty="0"/>
-              <a:t>Java</a:t>
-            </a:r>
-          </a:p>
-          <a:p>
-            <a:r>
-              <a:rPr lang="pl-PL" dirty="0" err="1"/>
-              <a:t>JavaFX</a:t>
-            </a:r>
-            <a:endParaRPr lang="pl-PL" dirty="0"/>
-          </a:p>
-          <a:p>
-            <a:r>
-              <a:rPr lang="pl-PL" dirty="0" err="1"/>
-              <a:t>gitHub</a:t>
-            </a:r>
-            <a:r>
-              <a:rPr lang="pl-PL" dirty="0"/>
-              <a:t>/</a:t>
-            </a:r>
-            <a:r>
-              <a:rPr lang="pl-PL" dirty="0" err="1"/>
-              <a:t>bitbucket</a:t>
-            </a:r>
-            <a:endParaRPr lang="pl-PL" dirty="0"/>
-          </a:p>
-          <a:p>
-            <a:endParaRPr lang="pl-PL" dirty="0"/>
-          </a:p>
-          <a:p>
-            <a:endParaRPr lang="pl-PL" dirty="0"/>
-          </a:p>
-          <a:p>
-            <a:pPr marL="0" indent="0">
-              <a:buNone/>
-            </a:pPr>
-            <a:endParaRPr lang="pl-PL" dirty="0"/>
-          </a:p>
-        </p:txBody>
-      </p:sp>
-      <p:pic>
-        <p:nvPicPr>
-          <p:cNvPr id="1028" name="Picture 4" descr="Znalezione obrazy dla zapytania java">
-            <a:extLst>
-              <a:ext uri="{FF2B5EF4-FFF2-40B4-BE49-F238E27FC236}">
-                <a16:creationId xmlns:a16="http://schemas.microsoft.com/office/drawing/2014/main" id="{AB686416-8C3D-4AA6-9B88-7BC9ED81A545}"/>
-              </a:ext>
-            </a:extLst>
-          </p:cNvPr>
-          <p:cNvPicPr>
-            <a:picLocks noChangeAspect="1" noChangeArrowheads="1"/>
-          </p:cNvPicPr>
-          <p:nvPr/>
-        </p:nvPicPr>
-        <p:blipFill>
-          <a:blip r:embed="rId2">
-            <a:extLst>
-              <a:ext uri="{28A0092B-C50C-407E-A947-70E740481C1C}">
-                <a14:useLocalDpi xmlns:a14="http://schemas.microsoft.com/office/drawing/2010/main" val="0"/>
-              </a:ext>
-            </a:extLst>
-          </a:blip>
-          <a:srcRect/>
-          <a:stretch>
-            <a:fillRect/>
-          </a:stretch>
-        </p:blipFill>
-        <p:spPr bwMode="auto">
-          <a:xfrm>
-            <a:off x="5284589" y="1500922"/>
-            <a:ext cx="5408989" cy="4056742"/>
-          </a:xfrm>
-          <a:prstGeom prst="rect">
-            <a:avLst/>
-          </a:prstGeom>
-          <a:noFill/>
-          <a:extLst>
-            <a:ext uri="{909E8E84-426E-40DD-AFC4-6F175D3DCCD1}">
-              <a14:hiddenFill xmlns:a14="http://schemas.microsoft.com/office/drawing/2010/main">
-                <a:solidFill>
-                  <a:srgbClr val="FFFFFF"/>
-                </a:solidFill>
-              </a14:hiddenFill>
-            </a:ext>
-          </a:extLst>
-        </p:spPr>
-      </p:pic>
-    </p:spTree>
-    <p:extLst>
-      <p:ext uri="{BB962C8B-B14F-4D97-AF65-F5344CB8AC3E}">
-        <p14:creationId xmlns:p14="http://schemas.microsoft.com/office/powerpoint/2010/main" val="224974404"/>
-      </p:ext>
-    </p:extLst>
-  </p:cSld>
-  <p:clrMapOvr>
-    <a:masterClrMapping/>
-  </p:clrMapOvr>
-</p:sld>
-</file>
-
-<file path=ppt/slides/slide6.xml><?xml version="1.0" encoding="utf-8"?>
+<file path=ppt/slides/slide10.xml><?xml version="1.0" encoding="utf-8"?>
 <p:sld xmlns:a="http://schemas.openxmlformats.org/drawingml/2006/main" xmlns:r="http://schemas.openxmlformats.org/officeDocument/2006/relationships" xmlns:p="http://schemas.openxmlformats.org/presentationml/2006/main">
   <p:cSld>
     <p:spTree>
@@ -7549,6 +6984,1181 @@
     <p:extLst>
       <p:ext uri="{BB962C8B-B14F-4D97-AF65-F5344CB8AC3E}">
         <p14:creationId xmlns:p14="http://schemas.microsoft.com/office/powerpoint/2010/main" val="1110739496"/>
+      </p:ext>
+    </p:extLst>
+  </p:cSld>
+  <p:clrMapOvr>
+    <a:masterClrMapping/>
+  </p:clrMapOvr>
+</p:sld>
+</file>
+
+<file path=ppt/slides/slide2.xml><?xml version="1.0" encoding="utf-8"?>
+<p:sld xmlns:a="http://schemas.openxmlformats.org/drawingml/2006/main" xmlns:r="http://schemas.openxmlformats.org/officeDocument/2006/relationships" xmlns:p="http://schemas.openxmlformats.org/presentationml/2006/main">
+  <p:cSld>
+    <p:spTree>
+      <p:nvGrpSpPr>
+        <p:cNvPr id="1" name=""/>
+        <p:cNvGrpSpPr/>
+        <p:nvPr/>
+      </p:nvGrpSpPr>
+      <p:grpSpPr>
+        <a:xfrm>
+          <a:off x="0" y="0"/>
+          <a:ext cx="0" cy="0"/>
+          <a:chOff x="0" y="0"/>
+          <a:chExt cx="0" cy="0"/>
+        </a:xfrm>
+      </p:grpSpPr>
+      <p:sp>
+        <p:nvSpPr>
+          <p:cNvPr id="2" name="Tytuł 1">
+            <a:extLst>
+              <a:ext uri="{FF2B5EF4-FFF2-40B4-BE49-F238E27FC236}">
+                <a16:creationId xmlns:a16="http://schemas.microsoft.com/office/drawing/2014/main" id="{031652CF-B04C-41DF-8F93-2CFA6B82FF52}"/>
+              </a:ext>
+            </a:extLst>
+          </p:cNvPr>
+          <p:cNvSpPr>
+            <a:spLocks noGrp="1"/>
+          </p:cNvSpPr>
+          <p:nvPr>
+            <p:ph type="title"/>
+          </p:nvPr>
+        </p:nvSpPr>
+        <p:spPr/>
+        <p:txBody>
+          <a:bodyPr/>
+          <a:lstStyle/>
+          <a:p>
+            <a:r>
+              <a:rPr lang="pl-PL" dirty="0"/>
+              <a:t>Komu</a:t>
+            </a:r>
+          </a:p>
+        </p:txBody>
+      </p:sp>
+      <p:sp>
+        <p:nvSpPr>
+          <p:cNvPr id="3" name="Symbol zastępczy zawartości 2">
+            <a:extLst>
+              <a:ext uri="{FF2B5EF4-FFF2-40B4-BE49-F238E27FC236}">
+                <a16:creationId xmlns:a16="http://schemas.microsoft.com/office/drawing/2014/main" id="{5E6BF7DD-E439-41AB-A274-7FEBA020E6D7}"/>
+              </a:ext>
+            </a:extLst>
+          </p:cNvPr>
+          <p:cNvSpPr>
+            <a:spLocks noGrp="1"/>
+          </p:cNvSpPr>
+          <p:nvPr>
+            <p:ph idx="1"/>
+          </p:nvPr>
+        </p:nvSpPr>
+        <p:spPr/>
+        <p:txBody>
+          <a:bodyPr/>
+          <a:lstStyle/>
+          <a:p>
+            <a:r>
+              <a:rPr lang="pl-PL" dirty="0"/>
+              <a:t>Naszym klientem jest Szkoła Fechtunku Aramis</a:t>
+            </a:r>
+          </a:p>
+        </p:txBody>
+      </p:sp>
+      <p:pic>
+        <p:nvPicPr>
+          <p:cNvPr id="5" name="Obraz 4">
+            <a:extLst>
+              <a:ext uri="{FF2B5EF4-FFF2-40B4-BE49-F238E27FC236}">
+                <a16:creationId xmlns:a16="http://schemas.microsoft.com/office/drawing/2014/main" id="{EAF66F46-3160-4DC9-B406-9F70D5576018}"/>
+              </a:ext>
+            </a:extLst>
+          </p:cNvPr>
+          <p:cNvPicPr>
+            <a:picLocks noChangeAspect="1"/>
+          </p:cNvPicPr>
+          <p:nvPr/>
+        </p:nvPicPr>
+        <p:blipFill>
+          <a:blip r:embed="rId2"/>
+          <a:stretch>
+            <a:fillRect/>
+          </a:stretch>
+        </p:blipFill>
+        <p:spPr>
+          <a:xfrm>
+            <a:off x="1509450" y="2902722"/>
+            <a:ext cx="2567600" cy="2567600"/>
+          </a:xfrm>
+          <a:prstGeom prst="rect">
+            <a:avLst/>
+          </a:prstGeom>
+        </p:spPr>
+      </p:pic>
+      <p:sp>
+        <p:nvSpPr>
+          <p:cNvPr id="6" name="Prostokąt 5">
+            <a:extLst>
+              <a:ext uri="{FF2B5EF4-FFF2-40B4-BE49-F238E27FC236}">
+                <a16:creationId xmlns:a16="http://schemas.microsoft.com/office/drawing/2014/main" id="{8F04DCCD-FE0A-4652-8EDA-8943EC6DFFB0}"/>
+              </a:ext>
+            </a:extLst>
+          </p:cNvPr>
+          <p:cNvSpPr/>
+          <p:nvPr/>
+        </p:nvSpPr>
+        <p:spPr>
+          <a:xfrm>
+            <a:off x="10029039" y="522557"/>
+            <a:ext cx="1400961" cy="1211787"/>
+          </a:xfrm>
+          <a:prstGeom prst="rect">
+            <a:avLst/>
+          </a:prstGeom>
+        </p:spPr>
+        <p:style>
+          <a:lnRef idx="2">
+            <a:schemeClr val="accent1">
+              <a:shade val="50000"/>
+            </a:schemeClr>
+          </a:lnRef>
+          <a:fillRef idx="1">
+            <a:schemeClr val="accent1"/>
+          </a:fillRef>
+          <a:effectRef idx="0">
+            <a:schemeClr val="accent1"/>
+          </a:effectRef>
+          <a:fontRef idx="minor">
+            <a:schemeClr val="lt1"/>
+          </a:fontRef>
+        </p:style>
+        <p:txBody>
+          <a:bodyPr rtlCol="0" anchor="ctr"/>
+          <a:lstStyle/>
+          <a:p>
+            <a:pPr algn="ctr"/>
+            <a:endParaRPr lang="pl-PL"/>
+          </a:p>
+        </p:txBody>
+      </p:sp>
+    </p:spTree>
+    <p:extLst>
+      <p:ext uri="{BB962C8B-B14F-4D97-AF65-F5344CB8AC3E}">
+        <p14:creationId xmlns:p14="http://schemas.microsoft.com/office/powerpoint/2010/main" val="3109064140"/>
+      </p:ext>
+    </p:extLst>
+  </p:cSld>
+  <p:clrMapOvr>
+    <a:masterClrMapping/>
+  </p:clrMapOvr>
+</p:sld>
+</file>
+
+<file path=ppt/slides/slide3.xml><?xml version="1.0" encoding="utf-8"?>
+<p:sld xmlns:a="http://schemas.openxmlformats.org/drawingml/2006/main" xmlns:r="http://schemas.openxmlformats.org/officeDocument/2006/relationships" xmlns:p="http://schemas.openxmlformats.org/presentationml/2006/main">
+  <p:cSld>
+    <p:spTree>
+      <p:nvGrpSpPr>
+        <p:cNvPr id="1" name=""/>
+        <p:cNvGrpSpPr/>
+        <p:nvPr/>
+      </p:nvGrpSpPr>
+      <p:grpSpPr>
+        <a:xfrm>
+          <a:off x="0" y="0"/>
+          <a:ext cx="0" cy="0"/>
+          <a:chOff x="0" y="0"/>
+          <a:chExt cx="0" cy="0"/>
+        </a:xfrm>
+      </p:grpSpPr>
+      <p:sp>
+        <p:nvSpPr>
+          <p:cNvPr id="2" name="Tytuł 1">
+            <a:extLst>
+              <a:ext uri="{FF2B5EF4-FFF2-40B4-BE49-F238E27FC236}">
+                <a16:creationId xmlns:a16="http://schemas.microsoft.com/office/drawing/2014/main" id="{06AD4AE1-6D8D-4A40-9DC8-8A446959CCD8}"/>
+              </a:ext>
+            </a:extLst>
+          </p:cNvPr>
+          <p:cNvSpPr>
+            <a:spLocks noGrp="1"/>
+          </p:cNvSpPr>
+          <p:nvPr>
+            <p:ph type="title"/>
+          </p:nvPr>
+        </p:nvSpPr>
+        <p:spPr/>
+        <p:txBody>
+          <a:bodyPr/>
+          <a:lstStyle/>
+          <a:p>
+            <a:r>
+              <a:rPr lang="pl-PL" dirty="0"/>
+              <a:t>Dlaczego</a:t>
+            </a:r>
+          </a:p>
+        </p:txBody>
+      </p:sp>
+      <p:sp>
+        <p:nvSpPr>
+          <p:cNvPr id="3" name="Symbol zastępczy zawartości 2">
+            <a:extLst>
+              <a:ext uri="{FF2B5EF4-FFF2-40B4-BE49-F238E27FC236}">
+                <a16:creationId xmlns:a16="http://schemas.microsoft.com/office/drawing/2014/main" id="{BF885557-C135-4F20-AE7B-A71AFA1191D3}"/>
+              </a:ext>
+            </a:extLst>
+          </p:cNvPr>
+          <p:cNvSpPr>
+            <a:spLocks noGrp="1"/>
+          </p:cNvSpPr>
+          <p:nvPr>
+            <p:ph idx="1"/>
+          </p:nvPr>
+        </p:nvSpPr>
+        <p:spPr/>
+        <p:txBody>
+          <a:bodyPr/>
+          <a:lstStyle/>
+          <a:p>
+            <a:r>
+              <a:rPr lang="pl-PL" dirty="0"/>
+              <a:t>Potrzeba elastycznego i niezawodnego programu do rozgrywania zawodów, ze względu na ciągły rozwój zasad przeprowadzania zawodów.</a:t>
+            </a:r>
+          </a:p>
+        </p:txBody>
+      </p:sp>
+      <p:sp>
+        <p:nvSpPr>
+          <p:cNvPr id="4" name="Prostokąt 3">
+            <a:extLst>
+              <a:ext uri="{FF2B5EF4-FFF2-40B4-BE49-F238E27FC236}">
+                <a16:creationId xmlns:a16="http://schemas.microsoft.com/office/drawing/2014/main" id="{80945A84-30C3-45CD-8099-95CB2D9AE98D}"/>
+              </a:ext>
+            </a:extLst>
+          </p:cNvPr>
+          <p:cNvSpPr/>
+          <p:nvPr/>
+        </p:nvSpPr>
+        <p:spPr>
+          <a:xfrm>
+            <a:off x="10029039" y="522557"/>
+            <a:ext cx="1400961" cy="1211787"/>
+          </a:xfrm>
+          <a:prstGeom prst="rect">
+            <a:avLst/>
+          </a:prstGeom>
+        </p:spPr>
+        <p:style>
+          <a:lnRef idx="2">
+            <a:schemeClr val="accent1">
+              <a:shade val="50000"/>
+            </a:schemeClr>
+          </a:lnRef>
+          <a:fillRef idx="1">
+            <a:schemeClr val="accent1"/>
+          </a:fillRef>
+          <a:effectRef idx="0">
+            <a:schemeClr val="accent1"/>
+          </a:effectRef>
+          <a:fontRef idx="minor">
+            <a:schemeClr val="lt1"/>
+          </a:fontRef>
+        </p:style>
+        <p:txBody>
+          <a:bodyPr rtlCol="0" anchor="ctr"/>
+          <a:lstStyle/>
+          <a:p>
+            <a:pPr algn="ctr"/>
+            <a:endParaRPr lang="pl-PL"/>
+          </a:p>
+        </p:txBody>
+      </p:sp>
+    </p:spTree>
+    <p:extLst>
+      <p:ext uri="{BB962C8B-B14F-4D97-AF65-F5344CB8AC3E}">
+        <p14:creationId xmlns:p14="http://schemas.microsoft.com/office/powerpoint/2010/main" val="2937997771"/>
+      </p:ext>
+    </p:extLst>
+  </p:cSld>
+  <p:clrMapOvr>
+    <a:masterClrMapping/>
+  </p:clrMapOvr>
+</p:sld>
+</file>
+
+<file path=ppt/slides/slide4.xml><?xml version="1.0" encoding="utf-8"?>
+<p:sld xmlns:a="http://schemas.openxmlformats.org/drawingml/2006/main" xmlns:r="http://schemas.openxmlformats.org/officeDocument/2006/relationships" xmlns:p="http://schemas.openxmlformats.org/presentationml/2006/main">
+  <p:cSld>
+    <p:spTree>
+      <p:nvGrpSpPr>
+        <p:cNvPr id="1" name=""/>
+        <p:cNvGrpSpPr/>
+        <p:nvPr/>
+      </p:nvGrpSpPr>
+      <p:grpSpPr>
+        <a:xfrm>
+          <a:off x="0" y="0"/>
+          <a:ext cx="0" cy="0"/>
+          <a:chOff x="0" y="0"/>
+          <a:chExt cx="0" cy="0"/>
+        </a:xfrm>
+      </p:grpSpPr>
+      <p:sp>
+        <p:nvSpPr>
+          <p:cNvPr id="2" name="Tytuł 1">
+            <a:extLst>
+              <a:ext uri="{FF2B5EF4-FFF2-40B4-BE49-F238E27FC236}">
+                <a16:creationId xmlns:a16="http://schemas.microsoft.com/office/drawing/2014/main" id="{702E222E-90DD-4711-A79C-8EF035BFE27A}"/>
+              </a:ext>
+            </a:extLst>
+          </p:cNvPr>
+          <p:cNvSpPr>
+            <a:spLocks noGrp="1"/>
+          </p:cNvSpPr>
+          <p:nvPr>
+            <p:ph type="title"/>
+          </p:nvPr>
+        </p:nvSpPr>
+        <p:spPr/>
+        <p:txBody>
+          <a:bodyPr/>
+          <a:lstStyle/>
+          <a:p>
+            <a:r>
+              <a:rPr lang="pl-PL" dirty="0"/>
+              <a:t>Wizja</a:t>
+            </a:r>
+          </a:p>
+        </p:txBody>
+      </p:sp>
+      <p:sp>
+        <p:nvSpPr>
+          <p:cNvPr id="3" name="Symbol zastępczy zawartości 2">
+            <a:extLst>
+              <a:ext uri="{FF2B5EF4-FFF2-40B4-BE49-F238E27FC236}">
+                <a16:creationId xmlns:a16="http://schemas.microsoft.com/office/drawing/2014/main" id="{E443DD13-261C-4866-83CA-9A33C38829B2}"/>
+              </a:ext>
+            </a:extLst>
+          </p:cNvPr>
+          <p:cNvSpPr>
+            <a:spLocks noGrp="1"/>
+          </p:cNvSpPr>
+          <p:nvPr>
+            <p:ph idx="1"/>
+          </p:nvPr>
+        </p:nvSpPr>
+        <p:spPr/>
+        <p:txBody>
+          <a:bodyPr/>
+          <a:lstStyle/>
+          <a:p>
+            <a:r>
+              <a:rPr lang="pl-PL" dirty="0"/>
+              <a:t>Celem projektu jest zapewnienie platformy mającej na celu organizacji i rozgrywania zwodów Nowoczesnej Szermierki Klasycznej. Zadaniem tego systemu będą takie składowe jak:</a:t>
+            </a:r>
+            <a:br>
+              <a:rPr lang="pl-PL" dirty="0"/>
+            </a:br>
+            <a:r>
+              <a:rPr lang="pl-PL" dirty="0"/>
+              <a:t>- wyznaczanie par walczących na każdym z etapów rozgrywek</a:t>
+            </a:r>
+            <a:br>
+              <a:rPr lang="pl-PL" dirty="0"/>
+            </a:br>
+            <a:r>
+              <a:rPr lang="pl-PL" dirty="0"/>
+              <a:t>- zbieranie wyników walk oraz ich przetwarzanie</a:t>
+            </a:r>
+            <a:br>
+              <a:rPr lang="pl-PL" dirty="0"/>
+            </a:br>
+            <a:r>
+              <a:rPr lang="pl-PL" dirty="0"/>
+              <a:t>- zapewnienie interfejsu operatora zawodów</a:t>
+            </a:r>
+            <a:br>
+              <a:rPr lang="pl-PL" dirty="0"/>
+            </a:br>
+            <a:r>
+              <a:rPr lang="pl-PL" dirty="0"/>
+              <a:t>- zapewnienie widoku publicznego</a:t>
+            </a:r>
+            <a:br>
+              <a:rPr lang="pl-PL" dirty="0"/>
+            </a:br>
+            <a:r>
+              <a:rPr lang="pl-PL" dirty="0"/>
+              <a:t>Istotnym elementem pracy jest zapewnienie niezawodności z uwagi na błędy wynikające z wypadków losowych oraz błędów operatora.</a:t>
+            </a:r>
+          </a:p>
+        </p:txBody>
+      </p:sp>
+    </p:spTree>
+    <p:extLst>
+      <p:ext uri="{BB962C8B-B14F-4D97-AF65-F5344CB8AC3E}">
+        <p14:creationId xmlns:p14="http://schemas.microsoft.com/office/powerpoint/2010/main" val="4247271838"/>
+      </p:ext>
+    </p:extLst>
+  </p:cSld>
+  <p:clrMapOvr>
+    <a:masterClrMapping/>
+  </p:clrMapOvr>
+</p:sld>
+</file>
+
+<file path=ppt/slides/slide5.xml><?xml version="1.0" encoding="utf-8"?>
+<p:sld xmlns:a="http://schemas.openxmlformats.org/drawingml/2006/main" xmlns:r="http://schemas.openxmlformats.org/officeDocument/2006/relationships" xmlns:p="http://schemas.openxmlformats.org/presentationml/2006/main">
+  <p:cSld>
+    <p:spTree>
+      <p:nvGrpSpPr>
+        <p:cNvPr id="1" name=""/>
+        <p:cNvGrpSpPr/>
+        <p:nvPr/>
+      </p:nvGrpSpPr>
+      <p:grpSpPr>
+        <a:xfrm>
+          <a:off x="0" y="0"/>
+          <a:ext cx="0" cy="0"/>
+          <a:chOff x="0" y="0"/>
+          <a:chExt cx="0" cy="0"/>
+        </a:xfrm>
+      </p:grpSpPr>
+      <p:sp>
+        <p:nvSpPr>
+          <p:cNvPr id="2" name="Tytuł 1">
+            <a:extLst>
+              <a:ext uri="{FF2B5EF4-FFF2-40B4-BE49-F238E27FC236}">
+                <a16:creationId xmlns:a16="http://schemas.microsoft.com/office/drawing/2014/main" id="{4EF821D0-3E7A-4503-8F48-395304BF8164}"/>
+              </a:ext>
+            </a:extLst>
+          </p:cNvPr>
+          <p:cNvSpPr>
+            <a:spLocks noGrp="1"/>
+          </p:cNvSpPr>
+          <p:nvPr>
+            <p:ph type="title"/>
+          </p:nvPr>
+        </p:nvSpPr>
+        <p:spPr/>
+        <p:txBody>
+          <a:bodyPr/>
+          <a:lstStyle/>
+          <a:p>
+            <a:r>
+              <a:rPr lang="pl-PL" dirty="0"/>
+              <a:t>Użytkownicy</a:t>
+            </a:r>
+          </a:p>
+        </p:txBody>
+      </p:sp>
+      <p:sp>
+        <p:nvSpPr>
+          <p:cNvPr id="3" name="Symbol zastępczy zawartości 2">
+            <a:extLst>
+              <a:ext uri="{FF2B5EF4-FFF2-40B4-BE49-F238E27FC236}">
+                <a16:creationId xmlns:a16="http://schemas.microsoft.com/office/drawing/2014/main" id="{FA640B05-093D-474A-B6AB-650814CE6981}"/>
+              </a:ext>
+            </a:extLst>
+          </p:cNvPr>
+          <p:cNvSpPr>
+            <a:spLocks noGrp="1"/>
+          </p:cNvSpPr>
+          <p:nvPr>
+            <p:ph idx="1"/>
+          </p:nvPr>
+        </p:nvSpPr>
+        <p:spPr/>
+        <p:txBody>
+          <a:bodyPr/>
+          <a:lstStyle/>
+          <a:p>
+            <a:r>
+              <a:rPr lang="pl-PL" dirty="0"/>
+              <a:t>Aktywni</a:t>
+            </a:r>
+          </a:p>
+          <a:p>
+            <a:pPr lvl="1"/>
+            <a:r>
+              <a:rPr lang="pl-PL" dirty="0"/>
+              <a:t>Operator programu(z dwoma poziomami dostępu)</a:t>
+            </a:r>
+          </a:p>
+          <a:p>
+            <a:r>
+              <a:rPr lang="pl-PL" dirty="0"/>
+              <a:t>Pasywni:</a:t>
+            </a:r>
+          </a:p>
+          <a:p>
+            <a:pPr lvl="1"/>
+            <a:r>
+              <a:rPr lang="pl-PL" dirty="0"/>
+              <a:t>Widzowie i zawodnicy</a:t>
+            </a:r>
+          </a:p>
+        </p:txBody>
+      </p:sp>
+      <p:sp>
+        <p:nvSpPr>
+          <p:cNvPr id="4" name="Prostokąt 3">
+            <a:extLst>
+              <a:ext uri="{FF2B5EF4-FFF2-40B4-BE49-F238E27FC236}">
+                <a16:creationId xmlns:a16="http://schemas.microsoft.com/office/drawing/2014/main" id="{A646AB9E-1735-4818-A268-20D7A2F6E319}"/>
+              </a:ext>
+            </a:extLst>
+          </p:cNvPr>
+          <p:cNvSpPr/>
+          <p:nvPr/>
+        </p:nvSpPr>
+        <p:spPr>
+          <a:xfrm>
+            <a:off x="10029039" y="522557"/>
+            <a:ext cx="1400961" cy="1211787"/>
+          </a:xfrm>
+          <a:prstGeom prst="rect">
+            <a:avLst/>
+          </a:prstGeom>
+        </p:spPr>
+        <p:style>
+          <a:lnRef idx="2">
+            <a:schemeClr val="accent1">
+              <a:shade val="50000"/>
+            </a:schemeClr>
+          </a:lnRef>
+          <a:fillRef idx="1">
+            <a:schemeClr val="accent1"/>
+          </a:fillRef>
+          <a:effectRef idx="0">
+            <a:schemeClr val="accent1"/>
+          </a:effectRef>
+          <a:fontRef idx="minor">
+            <a:schemeClr val="lt1"/>
+          </a:fontRef>
+        </p:style>
+        <p:txBody>
+          <a:bodyPr rtlCol="0" anchor="ctr"/>
+          <a:lstStyle/>
+          <a:p>
+            <a:pPr algn="ctr"/>
+            <a:endParaRPr lang="pl-PL"/>
+          </a:p>
+        </p:txBody>
+      </p:sp>
+    </p:spTree>
+    <p:extLst>
+      <p:ext uri="{BB962C8B-B14F-4D97-AF65-F5344CB8AC3E}">
+        <p14:creationId xmlns:p14="http://schemas.microsoft.com/office/powerpoint/2010/main" val="2650389328"/>
+      </p:ext>
+    </p:extLst>
+  </p:cSld>
+  <p:clrMapOvr>
+    <a:masterClrMapping/>
+  </p:clrMapOvr>
+</p:sld>
+</file>
+
+<file path=ppt/slides/slide6.xml><?xml version="1.0" encoding="utf-8"?>
+<p:sld xmlns:a="http://schemas.openxmlformats.org/drawingml/2006/main" xmlns:r="http://schemas.openxmlformats.org/officeDocument/2006/relationships" xmlns:p="http://schemas.openxmlformats.org/presentationml/2006/main">
+  <p:cSld>
+    <p:spTree>
+      <p:nvGrpSpPr>
+        <p:cNvPr id="1" name=""/>
+        <p:cNvGrpSpPr/>
+        <p:nvPr/>
+      </p:nvGrpSpPr>
+      <p:grpSpPr>
+        <a:xfrm>
+          <a:off x="0" y="0"/>
+          <a:ext cx="0" cy="0"/>
+          <a:chOff x="0" y="0"/>
+          <a:chExt cx="0" cy="0"/>
+        </a:xfrm>
+      </p:grpSpPr>
+      <p:sp>
+        <p:nvSpPr>
+          <p:cNvPr id="2" name="Tytuł 1">
+            <a:extLst>
+              <a:ext uri="{FF2B5EF4-FFF2-40B4-BE49-F238E27FC236}">
+                <a16:creationId xmlns:a16="http://schemas.microsoft.com/office/drawing/2014/main" id="{F34AA2D7-E321-4DA0-BC32-9B19DDFE9CB5}"/>
+              </a:ext>
+            </a:extLst>
+          </p:cNvPr>
+          <p:cNvSpPr>
+            <a:spLocks noGrp="1"/>
+          </p:cNvSpPr>
+          <p:nvPr>
+            <p:ph type="title"/>
+          </p:nvPr>
+        </p:nvSpPr>
+        <p:spPr/>
+        <p:txBody>
+          <a:bodyPr/>
+          <a:lstStyle/>
+          <a:p>
+            <a:r>
+              <a:rPr lang="pl-PL" dirty="0"/>
+              <a:t>Koncepcja </a:t>
+            </a:r>
+            <a:br>
+              <a:rPr lang="pl-PL" dirty="0"/>
+            </a:br>
+            <a:r>
+              <a:rPr lang="pl-PL" dirty="0"/>
+              <a:t>systemu</a:t>
+            </a:r>
+          </a:p>
+        </p:txBody>
+      </p:sp>
+      <p:sp>
+        <p:nvSpPr>
+          <p:cNvPr id="3" name="Symbol zastępczy zawartości 2">
+            <a:extLst>
+              <a:ext uri="{FF2B5EF4-FFF2-40B4-BE49-F238E27FC236}">
+                <a16:creationId xmlns:a16="http://schemas.microsoft.com/office/drawing/2014/main" id="{4CDAE5A1-1768-42D2-AD77-CEFCF6226EF4}"/>
+              </a:ext>
+            </a:extLst>
+          </p:cNvPr>
+          <p:cNvSpPr>
+            <a:spLocks noGrp="1"/>
+          </p:cNvSpPr>
+          <p:nvPr>
+            <p:ph idx="1"/>
+          </p:nvPr>
+        </p:nvSpPr>
+        <p:spPr/>
+        <p:txBody>
+          <a:bodyPr/>
+          <a:lstStyle/>
+          <a:p>
+            <a:r>
+              <a:rPr lang="pl-PL" dirty="0"/>
+              <a:t>Wykorzystamy:</a:t>
+            </a:r>
+          </a:p>
+          <a:p>
+            <a:pPr lvl="1"/>
+            <a:r>
+              <a:rPr lang="pl-PL" dirty="0"/>
+              <a:t>MVP</a:t>
+            </a:r>
+          </a:p>
+          <a:p>
+            <a:pPr lvl="1"/>
+            <a:r>
+              <a:rPr lang="pl-PL" dirty="0"/>
+              <a:t>Command Stack</a:t>
+            </a:r>
+          </a:p>
+          <a:p>
+            <a:pPr lvl="1"/>
+            <a:r>
+              <a:rPr lang="pl-PL" dirty="0"/>
+              <a:t>Strategy</a:t>
+            </a:r>
+          </a:p>
+          <a:p>
+            <a:pPr lvl="1"/>
+            <a:r>
+              <a:rPr lang="pl-PL" dirty="0"/>
+              <a:t>…</a:t>
+            </a:r>
+          </a:p>
+          <a:p>
+            <a:endParaRPr lang="pl-PL" dirty="0"/>
+          </a:p>
+        </p:txBody>
+      </p:sp>
+      <p:pic>
+        <p:nvPicPr>
+          <p:cNvPr id="5" name="Obraz 4">
+            <a:extLst>
+              <a:ext uri="{FF2B5EF4-FFF2-40B4-BE49-F238E27FC236}">
+                <a16:creationId xmlns:a16="http://schemas.microsoft.com/office/drawing/2014/main" id="{93F7D8D4-B8AE-4D04-AF6B-B1E04ED074F0}"/>
+              </a:ext>
+            </a:extLst>
+          </p:cNvPr>
+          <p:cNvPicPr>
+            <a:picLocks noChangeAspect="1"/>
+          </p:cNvPicPr>
+          <p:nvPr/>
+        </p:nvPicPr>
+        <p:blipFill>
+          <a:blip r:embed="rId2"/>
+          <a:stretch>
+            <a:fillRect/>
+          </a:stretch>
+        </p:blipFill>
+        <p:spPr>
+          <a:xfrm>
+            <a:off x="5299421" y="0"/>
+            <a:ext cx="6592995" cy="6858000"/>
+          </a:xfrm>
+          <a:prstGeom prst="rect">
+            <a:avLst/>
+          </a:prstGeom>
+        </p:spPr>
+      </p:pic>
+    </p:spTree>
+    <p:extLst>
+      <p:ext uri="{BB962C8B-B14F-4D97-AF65-F5344CB8AC3E}">
+        <p14:creationId xmlns:p14="http://schemas.microsoft.com/office/powerpoint/2010/main" val="1933639180"/>
+      </p:ext>
+    </p:extLst>
+  </p:cSld>
+  <p:clrMapOvr>
+    <a:masterClrMapping/>
+  </p:clrMapOvr>
+</p:sld>
+</file>
+
+<file path=ppt/slides/slide7.xml><?xml version="1.0" encoding="utf-8"?>
+<p:sld xmlns:a="http://schemas.openxmlformats.org/drawingml/2006/main" xmlns:r="http://schemas.openxmlformats.org/officeDocument/2006/relationships" xmlns:p="http://schemas.openxmlformats.org/presentationml/2006/main">
+  <p:cSld>
+    <p:spTree>
+      <p:nvGrpSpPr>
+        <p:cNvPr id="1" name=""/>
+        <p:cNvGrpSpPr/>
+        <p:nvPr/>
+      </p:nvGrpSpPr>
+      <p:grpSpPr>
+        <a:xfrm>
+          <a:off x="0" y="0"/>
+          <a:ext cx="0" cy="0"/>
+          <a:chOff x="0" y="0"/>
+          <a:chExt cx="0" cy="0"/>
+        </a:xfrm>
+      </p:grpSpPr>
+      <p:sp>
+        <p:nvSpPr>
+          <p:cNvPr id="2" name="Tytuł 1">
+            <a:extLst>
+              <a:ext uri="{FF2B5EF4-FFF2-40B4-BE49-F238E27FC236}">
+                <a16:creationId xmlns:a16="http://schemas.microsoft.com/office/drawing/2014/main" id="{8893EAF6-77BA-4088-ADAD-8D082152739B}"/>
+              </a:ext>
+            </a:extLst>
+          </p:cNvPr>
+          <p:cNvSpPr>
+            <a:spLocks noGrp="1"/>
+          </p:cNvSpPr>
+          <p:nvPr>
+            <p:ph type="title"/>
+          </p:nvPr>
+        </p:nvSpPr>
+        <p:spPr/>
+        <p:txBody>
+          <a:bodyPr/>
+          <a:lstStyle/>
+          <a:p>
+            <a:r>
+              <a:rPr lang="pl-PL" dirty="0"/>
+              <a:t>Wymagania Funkcjonalne</a:t>
+            </a:r>
+          </a:p>
+        </p:txBody>
+      </p:sp>
+      <p:sp>
+        <p:nvSpPr>
+          <p:cNvPr id="3" name="Symbol zastępczy zawartości 2">
+            <a:extLst>
+              <a:ext uri="{FF2B5EF4-FFF2-40B4-BE49-F238E27FC236}">
+                <a16:creationId xmlns:a16="http://schemas.microsoft.com/office/drawing/2014/main" id="{A08566AA-8F43-444B-BB48-44CE4E6851CA}"/>
+              </a:ext>
+            </a:extLst>
+          </p:cNvPr>
+          <p:cNvSpPr>
+            <a:spLocks noGrp="1"/>
+          </p:cNvSpPr>
+          <p:nvPr>
+            <p:ph idx="1"/>
+          </p:nvPr>
+        </p:nvSpPr>
+        <p:spPr/>
+        <p:txBody>
+          <a:bodyPr/>
+          <a:lstStyle/>
+          <a:p>
+            <a:r>
+              <a:rPr lang="pl-PL" dirty="0"/>
+              <a:t>Zapis ręczny i automatyczny stanu zawodów</a:t>
+            </a:r>
+          </a:p>
+          <a:p>
+            <a:r>
+              <a:rPr lang="pl-PL" dirty="0"/>
+              <a:t>Tryb wczytywania ustawień z pliku konfiguracyjnego (z możliwością ręcznej modyfikacje w trakcie pracy)</a:t>
+            </a:r>
+          </a:p>
+          <a:p>
+            <a:r>
+              <a:rPr lang="pl-PL" dirty="0"/>
+              <a:t>Umożliwienie dobierania strategii wyboru grup zawodników oraz wyboru tzw.  </a:t>
+            </a:r>
+            <a:r>
+              <a:rPr lang="pl-PL" dirty="0" err="1"/>
+              <a:t>killerów</a:t>
+            </a:r>
+            <a:endParaRPr lang="pl-PL" dirty="0"/>
+          </a:p>
+          <a:p>
+            <a:r>
+              <a:rPr lang="pl-PL" dirty="0"/>
+              <a:t>Pełne </a:t>
+            </a:r>
+            <a:r>
+              <a:rPr lang="pl-PL" dirty="0" err="1"/>
+              <a:t>Undo</a:t>
+            </a:r>
+            <a:r>
+              <a:rPr lang="pl-PL" dirty="0"/>
+              <a:t>-Redo (aż do startu zawodów)</a:t>
+            </a:r>
+          </a:p>
+          <a:p>
+            <a:r>
+              <a:rPr lang="pl-PL" dirty="0"/>
+              <a:t>Wyświetlanie wyników walk dla publiczności (nie zależnie od operatorów)</a:t>
+            </a:r>
+          </a:p>
+          <a:p>
+            <a:r>
+              <a:rPr lang="pl-PL" dirty="0"/>
+              <a:t>I wiele innych podanych przez klienta…</a:t>
+            </a:r>
+          </a:p>
+          <a:p>
+            <a:endParaRPr lang="pl-PL" dirty="0"/>
+          </a:p>
+        </p:txBody>
+      </p:sp>
+    </p:spTree>
+    <p:extLst>
+      <p:ext uri="{BB962C8B-B14F-4D97-AF65-F5344CB8AC3E}">
+        <p14:creationId xmlns:p14="http://schemas.microsoft.com/office/powerpoint/2010/main" val="2390996217"/>
+      </p:ext>
+    </p:extLst>
+  </p:cSld>
+  <p:clrMapOvr>
+    <a:masterClrMapping/>
+  </p:clrMapOvr>
+</p:sld>
+</file>
+
+<file path=ppt/slides/slide8.xml><?xml version="1.0" encoding="utf-8"?>
+<p:sld xmlns:a="http://schemas.openxmlformats.org/drawingml/2006/main" xmlns:r="http://schemas.openxmlformats.org/officeDocument/2006/relationships" xmlns:p="http://schemas.openxmlformats.org/presentationml/2006/main">
+  <p:cSld>
+    <p:spTree>
+      <p:nvGrpSpPr>
+        <p:cNvPr id="1" name=""/>
+        <p:cNvGrpSpPr/>
+        <p:nvPr/>
+      </p:nvGrpSpPr>
+      <p:grpSpPr>
+        <a:xfrm>
+          <a:off x="0" y="0"/>
+          <a:ext cx="0" cy="0"/>
+          <a:chOff x="0" y="0"/>
+          <a:chExt cx="0" cy="0"/>
+        </a:xfrm>
+      </p:grpSpPr>
+      <p:sp>
+        <p:nvSpPr>
+          <p:cNvPr id="2" name="Tytuł 1">
+            <a:extLst>
+              <a:ext uri="{FF2B5EF4-FFF2-40B4-BE49-F238E27FC236}">
+                <a16:creationId xmlns:a16="http://schemas.microsoft.com/office/drawing/2014/main" id="{5AC4AA1B-DDD7-4203-9EFA-3E47584675EF}"/>
+              </a:ext>
+            </a:extLst>
+          </p:cNvPr>
+          <p:cNvSpPr>
+            <a:spLocks noGrp="1"/>
+          </p:cNvSpPr>
+          <p:nvPr>
+            <p:ph type="title"/>
+          </p:nvPr>
+        </p:nvSpPr>
+        <p:spPr/>
+        <p:txBody>
+          <a:bodyPr/>
+          <a:lstStyle/>
+          <a:p>
+            <a:r>
+              <a:rPr lang="pl-PL" dirty="0"/>
+              <a:t>Wymagania niefunkcjonalne</a:t>
+            </a:r>
+          </a:p>
+        </p:txBody>
+      </p:sp>
+      <p:sp>
+        <p:nvSpPr>
+          <p:cNvPr id="3" name="Symbol zastępczy zawartości 2">
+            <a:extLst>
+              <a:ext uri="{FF2B5EF4-FFF2-40B4-BE49-F238E27FC236}">
+                <a16:creationId xmlns:a16="http://schemas.microsoft.com/office/drawing/2014/main" id="{7054D050-0E05-405D-A2E5-1F3AC040BF74}"/>
+              </a:ext>
+            </a:extLst>
+          </p:cNvPr>
+          <p:cNvSpPr>
+            <a:spLocks noGrp="1"/>
+          </p:cNvSpPr>
+          <p:nvPr>
+            <p:ph idx="1"/>
+          </p:nvPr>
+        </p:nvSpPr>
+        <p:spPr/>
+        <p:txBody>
+          <a:bodyPr/>
+          <a:lstStyle/>
+          <a:p>
+            <a:r>
+              <a:rPr lang="pl-PL" dirty="0"/>
+              <a:t>Nacisk na niezawodność i odtwarzalność danych</a:t>
+            </a:r>
+          </a:p>
+          <a:p>
+            <a:r>
+              <a:rPr lang="pl-PL" dirty="0"/>
+              <a:t>System ma funkcjonować niezawodnie do 50 osób</a:t>
+            </a:r>
+          </a:p>
+          <a:p>
+            <a:r>
+              <a:rPr lang="pl-PL" dirty="0"/>
+              <a:t>Odporność na błędy użytkownika.</a:t>
+            </a:r>
+          </a:p>
+          <a:p>
+            <a:endParaRPr lang="pl-PL" dirty="0"/>
+          </a:p>
+          <a:p>
+            <a:endParaRPr lang="pl-PL" dirty="0"/>
+          </a:p>
+        </p:txBody>
+      </p:sp>
+      <p:sp>
+        <p:nvSpPr>
+          <p:cNvPr id="4" name="Prostokąt 3">
+            <a:extLst>
+              <a:ext uri="{FF2B5EF4-FFF2-40B4-BE49-F238E27FC236}">
+                <a16:creationId xmlns:a16="http://schemas.microsoft.com/office/drawing/2014/main" id="{5C919DCB-377A-402E-9FE4-73E5ADE9B4E0}"/>
+              </a:ext>
+            </a:extLst>
+          </p:cNvPr>
+          <p:cNvSpPr/>
+          <p:nvPr/>
+        </p:nvSpPr>
+        <p:spPr>
+          <a:xfrm>
+            <a:off x="10029039" y="522557"/>
+            <a:ext cx="1400961" cy="1211787"/>
+          </a:xfrm>
+          <a:prstGeom prst="rect">
+            <a:avLst/>
+          </a:prstGeom>
+        </p:spPr>
+        <p:style>
+          <a:lnRef idx="2">
+            <a:schemeClr val="accent1">
+              <a:shade val="50000"/>
+            </a:schemeClr>
+          </a:lnRef>
+          <a:fillRef idx="1">
+            <a:schemeClr val="accent1"/>
+          </a:fillRef>
+          <a:effectRef idx="0">
+            <a:schemeClr val="accent1"/>
+          </a:effectRef>
+          <a:fontRef idx="minor">
+            <a:schemeClr val="lt1"/>
+          </a:fontRef>
+        </p:style>
+        <p:txBody>
+          <a:bodyPr rtlCol="0" anchor="ctr"/>
+          <a:lstStyle/>
+          <a:p>
+            <a:pPr algn="ctr"/>
+            <a:endParaRPr lang="pl-PL"/>
+          </a:p>
+        </p:txBody>
+      </p:sp>
+    </p:spTree>
+    <p:extLst>
+      <p:ext uri="{BB962C8B-B14F-4D97-AF65-F5344CB8AC3E}">
+        <p14:creationId xmlns:p14="http://schemas.microsoft.com/office/powerpoint/2010/main" val="66344272"/>
+      </p:ext>
+    </p:extLst>
+  </p:cSld>
+  <p:clrMapOvr>
+    <a:masterClrMapping/>
+  </p:clrMapOvr>
+</p:sld>
+</file>
+
+<file path=ppt/slides/slide9.xml><?xml version="1.0" encoding="utf-8"?>
+<p:sld xmlns:a="http://schemas.openxmlformats.org/drawingml/2006/main" xmlns:r="http://schemas.openxmlformats.org/officeDocument/2006/relationships" xmlns:p="http://schemas.openxmlformats.org/presentationml/2006/main">
+  <p:cSld>
+    <p:spTree>
+      <p:nvGrpSpPr>
+        <p:cNvPr id="1" name=""/>
+        <p:cNvGrpSpPr/>
+        <p:nvPr/>
+      </p:nvGrpSpPr>
+      <p:grpSpPr>
+        <a:xfrm>
+          <a:off x="0" y="0"/>
+          <a:ext cx="0" cy="0"/>
+          <a:chOff x="0" y="0"/>
+          <a:chExt cx="0" cy="0"/>
+        </a:xfrm>
+      </p:grpSpPr>
+      <p:sp>
+        <p:nvSpPr>
+          <p:cNvPr id="2" name="Tytuł 1">
+            <a:extLst>
+              <a:ext uri="{FF2B5EF4-FFF2-40B4-BE49-F238E27FC236}">
+                <a16:creationId xmlns:a16="http://schemas.microsoft.com/office/drawing/2014/main" id="{33BDCB46-5B13-40E4-822D-AE5FFD46E052}"/>
+              </a:ext>
+            </a:extLst>
+          </p:cNvPr>
+          <p:cNvSpPr>
+            <a:spLocks noGrp="1"/>
+          </p:cNvSpPr>
+          <p:nvPr>
+            <p:ph type="title"/>
+          </p:nvPr>
+        </p:nvSpPr>
+        <p:spPr/>
+        <p:txBody>
+          <a:bodyPr/>
+          <a:lstStyle/>
+          <a:p>
+            <a:r>
+              <a:rPr lang="pl-PL" dirty="0"/>
+              <a:t>Technologia</a:t>
+            </a:r>
+          </a:p>
+        </p:txBody>
+      </p:sp>
+      <p:sp>
+        <p:nvSpPr>
+          <p:cNvPr id="3" name="Symbol zastępczy zawartości 2">
+            <a:extLst>
+              <a:ext uri="{FF2B5EF4-FFF2-40B4-BE49-F238E27FC236}">
+                <a16:creationId xmlns:a16="http://schemas.microsoft.com/office/drawing/2014/main" id="{EC55762C-E05D-4E1F-86B8-2148B1C6A497}"/>
+              </a:ext>
+            </a:extLst>
+          </p:cNvPr>
+          <p:cNvSpPr>
+            <a:spLocks noGrp="1"/>
+          </p:cNvSpPr>
+          <p:nvPr>
+            <p:ph idx="1"/>
+          </p:nvPr>
+        </p:nvSpPr>
+        <p:spPr>
+          <a:xfrm>
+            <a:off x="1251677" y="1763487"/>
+            <a:ext cx="10178322" cy="3593591"/>
+          </a:xfrm>
+        </p:spPr>
+        <p:txBody>
+          <a:bodyPr/>
+          <a:lstStyle/>
+          <a:p>
+            <a:r>
+              <a:rPr lang="pl-PL" dirty="0"/>
+              <a:t>Java</a:t>
+            </a:r>
+          </a:p>
+          <a:p>
+            <a:r>
+              <a:rPr lang="pl-PL" dirty="0" err="1"/>
+              <a:t>JavaFX</a:t>
+            </a:r>
+            <a:endParaRPr lang="pl-PL" dirty="0"/>
+          </a:p>
+          <a:p>
+            <a:r>
+              <a:rPr lang="pl-PL" dirty="0" err="1"/>
+              <a:t>gitHub</a:t>
+            </a:r>
+            <a:r>
+              <a:rPr lang="pl-PL" dirty="0"/>
+              <a:t>/</a:t>
+            </a:r>
+            <a:r>
+              <a:rPr lang="pl-PL" dirty="0" err="1"/>
+              <a:t>bitbucket</a:t>
+            </a:r>
+            <a:endParaRPr lang="pl-PL" dirty="0"/>
+          </a:p>
+          <a:p>
+            <a:endParaRPr lang="pl-PL" dirty="0"/>
+          </a:p>
+          <a:p>
+            <a:endParaRPr lang="pl-PL" dirty="0"/>
+          </a:p>
+          <a:p>
+            <a:pPr marL="0" indent="0">
+              <a:buNone/>
+            </a:pPr>
+            <a:endParaRPr lang="pl-PL" dirty="0"/>
+          </a:p>
+        </p:txBody>
+      </p:sp>
+      <p:pic>
+        <p:nvPicPr>
+          <p:cNvPr id="1028" name="Picture 4" descr="Znalezione obrazy dla zapytania java">
+            <a:extLst>
+              <a:ext uri="{FF2B5EF4-FFF2-40B4-BE49-F238E27FC236}">
+                <a16:creationId xmlns:a16="http://schemas.microsoft.com/office/drawing/2014/main" id="{AB686416-8C3D-4AA6-9B88-7BC9ED81A545}"/>
+              </a:ext>
+            </a:extLst>
+          </p:cNvPr>
+          <p:cNvPicPr>
+            <a:picLocks noChangeAspect="1" noChangeArrowheads="1"/>
+          </p:cNvPicPr>
+          <p:nvPr/>
+        </p:nvPicPr>
+        <p:blipFill>
+          <a:blip r:embed="rId2">
+            <a:extLst>
+              <a:ext uri="{28A0092B-C50C-407E-A947-70E740481C1C}">
+                <a14:useLocalDpi xmlns:a14="http://schemas.microsoft.com/office/drawing/2010/main" val="0"/>
+              </a:ext>
+            </a:extLst>
+          </a:blip>
+          <a:srcRect/>
+          <a:stretch>
+            <a:fillRect/>
+          </a:stretch>
+        </p:blipFill>
+        <p:spPr bwMode="auto">
+          <a:xfrm>
+            <a:off x="5284589" y="1500922"/>
+            <a:ext cx="5408989" cy="4056742"/>
+          </a:xfrm>
+          <a:prstGeom prst="rect">
+            <a:avLst/>
+          </a:prstGeom>
+          <a:noFill/>
+          <a:extLst>
+            <a:ext uri="{909E8E84-426E-40DD-AFC4-6F175D3DCCD1}">
+              <a14:hiddenFill xmlns:a14="http://schemas.microsoft.com/office/drawing/2010/main">
+                <a:solidFill>
+                  <a:srgbClr val="FFFFFF"/>
+                </a:solidFill>
+              </a14:hiddenFill>
+            </a:ext>
+          </a:extLst>
+        </p:spPr>
+      </p:pic>
+    </p:spTree>
+    <p:extLst>
+      <p:ext uri="{BB962C8B-B14F-4D97-AF65-F5344CB8AC3E}">
+        <p14:creationId xmlns:p14="http://schemas.microsoft.com/office/powerpoint/2010/main" val="224974404"/>
       </p:ext>
     </p:extLst>
   </p:cSld>

</xml_diff>